<commit_message>
Doku + Praesi Update
</commit_message>
<xml_diff>
--- a/Praesi.pptx
+++ b/Praesi.pptx
@@ -19,10 +19,11 @@
     <p:sldId id="266" r:id="rId13"/>
     <p:sldId id="272" r:id="rId14"/>
     <p:sldId id="273" r:id="rId15"/>
-    <p:sldId id="274" r:id="rId16"/>
-    <p:sldId id="275" r:id="rId17"/>
-    <p:sldId id="267" r:id="rId18"/>
-    <p:sldId id="263" r:id="rId19"/>
+    <p:sldId id="276" r:id="rId16"/>
+    <p:sldId id="274" r:id="rId17"/>
+    <p:sldId id="275" r:id="rId18"/>
+    <p:sldId id="267" r:id="rId19"/>
+    <p:sldId id="263" r:id="rId20"/>
   </p:sldIdLst>
   <p:sldSz cx="12192000" cy="6858000"/>
   <p:notesSz cx="6858000" cy="9144000"/>
@@ -121,6 +122,11 @@
       </a:defRPr>
     </a:lvl9pPr>
   </p:defaultTextStyle>
+  <p:extLst>
+    <p:ext uri="{EFAFB233-063F-42B5-8137-9DF3F51BA10A}">
+      <p15:sldGuideLst xmlns:p15="http://schemas.microsoft.com/office/powerpoint/2012/main"/>
+    </p:ext>
+  </p:extLst>
 </p:presentation>
 </file>
 
@@ -846,7 +852,7 @@
           <a:p>
             <a:fld id="{25603A24-7872-46E1-9181-D252AF9AEB68}" type="datetimeFigureOut">
               <a:rPr lang="de-DE" smtClean="0"/>
-              <a:t>23.01.2019</a:t>
+              <a:t>25.01.2019</a:t>
             </a:fld>
             <a:endParaRPr lang="de-DE"/>
           </a:p>
@@ -1097,7 +1103,7 @@
           <a:p>
             <a:fld id="{25603A24-7872-46E1-9181-D252AF9AEB68}" type="datetimeFigureOut">
               <a:rPr lang="de-DE" smtClean="0"/>
-              <a:t>23.01.2019</a:t>
+              <a:t>25.01.2019</a:t>
             </a:fld>
             <a:endParaRPr lang="de-DE"/>
           </a:p>
@@ -1411,7 +1417,7 @@
           <a:p>
             <a:fld id="{25603A24-7872-46E1-9181-D252AF9AEB68}" type="datetimeFigureOut">
               <a:rPr lang="de-DE" smtClean="0"/>
-              <a:t>23.01.2019</a:t>
+              <a:t>25.01.2019</a:t>
             </a:fld>
             <a:endParaRPr lang="de-DE"/>
           </a:p>
@@ -1752,7 +1758,7 @@
           <a:p>
             <a:fld id="{25603A24-7872-46E1-9181-D252AF9AEB68}" type="datetimeFigureOut">
               <a:rPr lang="de-DE" smtClean="0"/>
-              <a:t>23.01.2019</a:t>
+              <a:t>25.01.2019</a:t>
             </a:fld>
             <a:endParaRPr lang="de-DE"/>
           </a:p>
@@ -2066,7 +2072,7 @@
           <a:p>
             <a:fld id="{25603A24-7872-46E1-9181-D252AF9AEB68}" type="datetimeFigureOut">
               <a:rPr lang="de-DE" smtClean="0"/>
-              <a:t>23.01.2019</a:t>
+              <a:t>25.01.2019</a:t>
             </a:fld>
             <a:endParaRPr lang="de-DE"/>
           </a:p>
@@ -2459,7 +2465,7 @@
           <a:p>
             <a:fld id="{25603A24-7872-46E1-9181-D252AF9AEB68}" type="datetimeFigureOut">
               <a:rPr lang="de-DE" smtClean="0"/>
-              <a:t>23.01.2019</a:t>
+              <a:t>25.01.2019</a:t>
             </a:fld>
             <a:endParaRPr lang="de-DE"/>
           </a:p>
@@ -2629,7 +2635,7 @@
           <a:p>
             <a:fld id="{25603A24-7872-46E1-9181-D252AF9AEB68}" type="datetimeFigureOut">
               <a:rPr lang="de-DE" smtClean="0"/>
-              <a:t>23.01.2019</a:t>
+              <a:t>25.01.2019</a:t>
             </a:fld>
             <a:endParaRPr lang="de-DE"/>
           </a:p>
@@ -2809,7 +2815,7 @@
           <a:p>
             <a:fld id="{25603A24-7872-46E1-9181-D252AF9AEB68}" type="datetimeFigureOut">
               <a:rPr lang="de-DE" smtClean="0"/>
-              <a:t>23.01.2019</a:t>
+              <a:t>25.01.2019</a:t>
             </a:fld>
             <a:endParaRPr lang="de-DE"/>
           </a:p>
@@ -2985,7 +2991,7 @@
           <a:p>
             <a:fld id="{25603A24-7872-46E1-9181-D252AF9AEB68}" type="datetimeFigureOut">
               <a:rPr lang="de-DE" smtClean="0"/>
-              <a:t>23.01.2019</a:t>
+              <a:t>25.01.2019</a:t>
             </a:fld>
             <a:endParaRPr lang="de-DE"/>
           </a:p>
@@ -3232,7 +3238,7 @@
           <a:p>
             <a:fld id="{25603A24-7872-46E1-9181-D252AF9AEB68}" type="datetimeFigureOut">
               <a:rPr lang="de-DE" smtClean="0"/>
-              <a:t>23.01.2019</a:t>
+              <a:t>25.01.2019</a:t>
             </a:fld>
             <a:endParaRPr lang="de-DE"/>
           </a:p>
@@ -3464,7 +3470,7 @@
           <a:p>
             <a:fld id="{25603A24-7872-46E1-9181-D252AF9AEB68}" type="datetimeFigureOut">
               <a:rPr lang="de-DE" smtClean="0"/>
-              <a:t>23.01.2019</a:t>
+              <a:t>25.01.2019</a:t>
             </a:fld>
             <a:endParaRPr lang="de-DE"/>
           </a:p>
@@ -3838,7 +3844,7 @@
           <a:p>
             <a:fld id="{25603A24-7872-46E1-9181-D252AF9AEB68}" type="datetimeFigureOut">
               <a:rPr lang="de-DE" smtClean="0"/>
-              <a:t>23.01.2019</a:t>
+              <a:t>25.01.2019</a:t>
             </a:fld>
             <a:endParaRPr lang="de-DE"/>
           </a:p>
@@ -3961,7 +3967,7 @@
           <a:p>
             <a:fld id="{25603A24-7872-46E1-9181-D252AF9AEB68}" type="datetimeFigureOut">
               <a:rPr lang="de-DE" smtClean="0"/>
-              <a:t>23.01.2019</a:t>
+              <a:t>25.01.2019</a:t>
             </a:fld>
             <a:endParaRPr lang="de-DE"/>
           </a:p>
@@ -4056,7 +4062,7 @@
           <a:p>
             <a:fld id="{25603A24-7872-46E1-9181-D252AF9AEB68}" type="datetimeFigureOut">
               <a:rPr lang="de-DE" smtClean="0"/>
-              <a:t>23.01.2019</a:t>
+              <a:t>25.01.2019</a:t>
             </a:fld>
             <a:endParaRPr lang="de-DE"/>
           </a:p>
@@ -4311,7 +4317,7 @@
           <a:p>
             <a:fld id="{25603A24-7872-46E1-9181-D252AF9AEB68}" type="datetimeFigureOut">
               <a:rPr lang="de-DE" smtClean="0"/>
-              <a:t>23.01.2019</a:t>
+              <a:t>25.01.2019</a:t>
             </a:fld>
             <a:endParaRPr lang="de-DE"/>
           </a:p>
@@ -4574,7 +4580,7 @@
           <a:p>
             <a:fld id="{25603A24-7872-46E1-9181-D252AF9AEB68}" type="datetimeFigureOut">
               <a:rPr lang="de-DE" smtClean="0"/>
-              <a:t>23.01.2019</a:t>
+              <a:t>25.01.2019</a:t>
             </a:fld>
             <a:endParaRPr lang="de-DE"/>
           </a:p>
@@ -5317,7 +5323,7 @@
           <a:p>
             <a:fld id="{25603A24-7872-46E1-9181-D252AF9AEB68}" type="datetimeFigureOut">
               <a:rPr lang="de-DE" smtClean="0"/>
-              <a:t>23.01.2019</a:t>
+              <a:t>25.01.2019</a:t>
             </a:fld>
             <a:endParaRPr lang="de-DE"/>
           </a:p>
@@ -6672,48 +6678,48 @@
           <a:p>
             <a:r>
               <a:rPr lang="de-DE" dirty="0"/>
-              <a:t>Unter Hilfe der </a:t>
-            </a:r>
-            <a:r>
-              <a:rPr lang="de-DE" dirty="0" err="1"/>
-              <a:t>Leap</a:t>
-            </a:r>
-            <a:r>
-              <a:rPr lang="de-DE" dirty="0"/>
-              <a:t> Motion API:</a:t>
+              <a:t>Funktion um ausgestreckte Finger zu erkenn</a:t>
             </a:r>
           </a:p>
           <a:p>
             <a:pPr lvl="1"/>
-            <a:r>
-              <a:rPr lang="de-DE" dirty="0"/>
-              <a:t>Funktion um ausgestreckte Finger zu erkenn</a:t>
-            </a:r>
-          </a:p>
-          <a:p>
-            <a:pPr lvl="2"/>
             <a:r>
               <a:rPr lang="de-DE" dirty="0">
                 <a:sym typeface="Wingdings" panose="05000000000000000000" pitchFamily="2" charset="2"/>
               </a:rPr>
               <a:t> Kamerawechsel</a:t>
             </a:r>
+          </a:p>
+          <a:p>
+            <a:pPr lvl="1"/>
+            <a:r>
+              <a:rPr lang="de-DE" dirty="0">
+                <a:sym typeface="Wingdings" panose="05000000000000000000" pitchFamily="2" charset="2"/>
+              </a:rPr>
+              <a:t>API</a:t>
+            </a:r>
             <a:endParaRPr lang="de-DE" dirty="0"/>
           </a:p>
           <a:p>
+            <a:r>
+              <a:rPr lang="de-DE" dirty="0"/>
+              <a:t>Funktion um Regengeste zu erkennen</a:t>
+            </a:r>
+          </a:p>
+          <a:p>
             <a:pPr lvl="1"/>
-            <a:r>
-              <a:rPr lang="de-DE" dirty="0"/>
-              <a:t>Funktion um Regengeste zu erkennen</a:t>
-            </a:r>
-          </a:p>
-          <a:p>
-            <a:pPr lvl="2"/>
             <a:r>
               <a:rPr lang="de-DE" dirty="0">
                 <a:sym typeface="Wingdings" panose="05000000000000000000" pitchFamily="2" charset="2"/>
               </a:rPr>
               <a:t> De-/Aktivieren von Wetter und öffnen/schließen Dachfenster</a:t>
+            </a:r>
+          </a:p>
+          <a:p>
+            <a:pPr lvl="1"/>
+            <a:r>
+              <a:rPr lang="de-DE" dirty="0"/>
+              <a:t>Frameweises Abspeichern und vergleichen</a:t>
             </a:r>
           </a:p>
           <a:p>
@@ -6835,7 +6841,29 @@
           <a:bodyPr/>
           <a:lstStyle/>
           <a:p>
-            <a:endParaRPr lang="de-DE"/>
+            <a:r>
+              <a:rPr lang="de-DE" dirty="0"/>
+              <a:t>2x4 und 2x2 Blöcke erstellt</a:t>
+            </a:r>
+          </a:p>
+          <a:p>
+            <a:pPr lvl="1"/>
+            <a:r>
+              <a:rPr lang="de-DE" dirty="0"/>
+              <a:t>Daraus das Haus nachgebaut</a:t>
+            </a:r>
+          </a:p>
+          <a:p>
+            <a:r>
+              <a:rPr lang="de-DE" dirty="0"/>
+              <a:t>Alle Anderen Bausteine auch nachgebaut und eigesetzt</a:t>
+            </a:r>
+          </a:p>
+          <a:p>
+            <a:r>
+              <a:rPr lang="de-DE" dirty="0"/>
+              <a:t>texturieren</a:t>
+            </a:r>
           </a:p>
         </p:txBody>
       </p:sp>
@@ -6927,7 +6955,73 @@
           <a:bodyPr/>
           <a:lstStyle/>
           <a:p>
-            <a:endParaRPr lang="de-DE"/>
+            <a:r>
+              <a:rPr lang="de-DE" dirty="0"/>
+              <a:t>Import vom Haus im FBX-Dateiformat</a:t>
+            </a:r>
+          </a:p>
+          <a:p>
+            <a:r>
+              <a:rPr lang="de-DE" dirty="0"/>
+              <a:t>Auswirkungen auf das Haus</a:t>
+            </a:r>
+          </a:p>
+          <a:p>
+            <a:pPr lvl="1"/>
+            <a:r>
+              <a:rPr lang="de-DE" dirty="0"/>
+              <a:t>Verändern des Wetters</a:t>
+            </a:r>
+          </a:p>
+          <a:p>
+            <a:pPr lvl="2"/>
+            <a:r>
+              <a:rPr lang="de-DE" dirty="0" err="1"/>
+              <a:t>Particle</a:t>
+            </a:r>
+            <a:r>
+              <a:rPr lang="de-DE" dirty="0"/>
+              <a:t>-System</a:t>
+            </a:r>
+          </a:p>
+          <a:p>
+            <a:pPr lvl="2"/>
+            <a:r>
+              <a:rPr lang="de-DE" dirty="0"/>
+              <a:t>Photoshop: Grafiken für Wolken, Nebel und Regentropfen</a:t>
+            </a:r>
+          </a:p>
+          <a:p>
+            <a:pPr lvl="1"/>
+            <a:r>
+              <a:rPr lang="de-DE" dirty="0"/>
+              <a:t>Fallender Magnet aus dem Schornstein</a:t>
+            </a:r>
+          </a:p>
+          <a:p>
+            <a:pPr lvl="1"/>
+            <a:r>
+              <a:rPr lang="de-DE" dirty="0"/>
+              <a:t>Veränderndes Licht / Ton</a:t>
+            </a:r>
+          </a:p>
+          <a:p>
+            <a:pPr lvl="1"/>
+            <a:r>
+              <a:rPr lang="de-DE" dirty="0"/>
+              <a:t>Öffnen von Türen</a:t>
+            </a:r>
+          </a:p>
+          <a:p>
+            <a:pPr lvl="1"/>
+            <a:r>
+              <a:rPr lang="de-DE" dirty="0"/>
+              <a:t>Reagieren auf veränderte Lage im Raum</a:t>
+            </a:r>
+          </a:p>
+          <a:p>
+            <a:pPr lvl="1"/>
+            <a:endParaRPr lang="de-DE" dirty="0"/>
           </a:p>
         </p:txBody>
       </p:sp>
@@ -7051,7 +7145,7 @@
           <a:p>
             <a:r>
               <a:rPr lang="de-DE" dirty="0"/>
-              <a:t>Alles logisch alles miteinander Verbunden</a:t>
+              <a:t>Alles logisch miteinander Verbunden</a:t>
             </a:r>
           </a:p>
         </p:txBody>
@@ -7091,7 +7185,7 @@
           <p:cNvPr id="2" name="Titel 1">
             <a:extLst>
               <a:ext uri="{FF2B5EF4-FFF2-40B4-BE49-F238E27FC236}">
-                <a16:creationId xmlns:a16="http://schemas.microsoft.com/office/drawing/2014/main" id="{94B370DC-0DBD-460C-A9A5-7F90F29FCBA1}"/>
+                <a16:creationId xmlns:a16="http://schemas.microsoft.com/office/drawing/2014/main" id="{2AFE4D76-4DD3-4272-BDCD-31D3E4129964}"/>
               </a:ext>
             </a:extLst>
           </p:cNvPr>
@@ -7107,7 +7201,10 @@
           <a:bodyPr/>
           <a:lstStyle/>
           <a:p>
-            <a:endParaRPr lang="de-DE"/>
+            <a:r>
+              <a:rPr lang="de-DE" dirty="0"/>
+              <a:t>Praxisvorführung ??? Oder erst beim Rundlauf?</a:t>
+            </a:r>
           </a:p>
         </p:txBody>
       </p:sp>
@@ -7116,7 +7213,7 @@
           <p:cNvPr id="3" name="Inhaltsplatzhalter 2">
             <a:extLst>
               <a:ext uri="{FF2B5EF4-FFF2-40B4-BE49-F238E27FC236}">
-                <a16:creationId xmlns:a16="http://schemas.microsoft.com/office/drawing/2014/main" id="{F3FF5607-2F68-4952-A817-60231D1E70C0}"/>
+                <a16:creationId xmlns:a16="http://schemas.microsoft.com/office/drawing/2014/main" id="{365DB64B-18CB-4F2D-932B-930D4A60B2C7}"/>
               </a:ext>
             </a:extLst>
           </p:cNvPr>
@@ -7139,7 +7236,7 @@
     </p:spTree>
     <p:extLst>
       <p:ext uri="{BB962C8B-B14F-4D97-AF65-F5344CB8AC3E}">
-        <p14:creationId xmlns:p14="http://schemas.microsoft.com/office/powerpoint/2010/main" val="3540254874"/>
+        <p14:creationId xmlns:p14="http://schemas.microsoft.com/office/powerpoint/2010/main" val="2356678492"/>
       </p:ext>
     </p:extLst>
   </p:cSld>
@@ -7171,7 +7268,7 @@
           <p:cNvPr id="2" name="Titel 1">
             <a:extLst>
               <a:ext uri="{FF2B5EF4-FFF2-40B4-BE49-F238E27FC236}">
-                <a16:creationId xmlns:a16="http://schemas.microsoft.com/office/drawing/2014/main" id="{05230602-F9F3-435F-931E-B19268151D0E}"/>
+                <a16:creationId xmlns:a16="http://schemas.microsoft.com/office/drawing/2014/main" id="{94B370DC-0DBD-460C-A9A5-7F90F29FCBA1}"/>
               </a:ext>
             </a:extLst>
           </p:cNvPr>
@@ -7187,7 +7284,10 @@
           <a:bodyPr/>
           <a:lstStyle/>
           <a:p>
-            <a:endParaRPr lang="de-DE"/>
+            <a:r>
+              <a:rPr lang="de-DE" dirty="0"/>
+              <a:t>Danke für eure Aufmerksamkeit</a:t>
+            </a:r>
           </a:p>
         </p:txBody>
       </p:sp>
@@ -7196,7 +7296,7 @@
           <p:cNvPr id="3" name="Inhaltsplatzhalter 2">
             <a:extLst>
               <a:ext uri="{FF2B5EF4-FFF2-40B4-BE49-F238E27FC236}">
-                <a16:creationId xmlns:a16="http://schemas.microsoft.com/office/drawing/2014/main" id="{D0172BEE-0B58-4F2D-9324-1B26BFE41ACA}"/>
+                <a16:creationId xmlns:a16="http://schemas.microsoft.com/office/drawing/2014/main" id="{F3FF5607-2F68-4952-A817-60231D1E70C0}"/>
               </a:ext>
             </a:extLst>
           </p:cNvPr>
@@ -7219,7 +7319,7 @@
     </p:spTree>
     <p:extLst>
       <p:ext uri="{BB962C8B-B14F-4D97-AF65-F5344CB8AC3E}">
-        <p14:creationId xmlns:p14="http://schemas.microsoft.com/office/powerpoint/2010/main" val="3903698768"/>
+        <p14:creationId xmlns:p14="http://schemas.microsoft.com/office/powerpoint/2010/main" val="3540254874"/>
       </p:ext>
     </p:extLst>
   </p:cSld>
@@ -7251,6 +7351,86 @@
           <p:cNvPr id="2" name="Titel 1">
             <a:extLst>
               <a:ext uri="{FF2B5EF4-FFF2-40B4-BE49-F238E27FC236}">
+                <a16:creationId xmlns:a16="http://schemas.microsoft.com/office/drawing/2014/main" id="{05230602-F9F3-435F-931E-B19268151D0E}"/>
+              </a:ext>
+            </a:extLst>
+          </p:cNvPr>
+          <p:cNvSpPr>
+            <a:spLocks noGrp="1"/>
+          </p:cNvSpPr>
+          <p:nvPr>
+            <p:ph type="title"/>
+          </p:nvPr>
+        </p:nvSpPr>
+        <p:spPr/>
+        <p:txBody>
+          <a:bodyPr/>
+          <a:lstStyle/>
+          <a:p>
+            <a:endParaRPr lang="de-DE"/>
+          </a:p>
+        </p:txBody>
+      </p:sp>
+      <p:sp>
+        <p:nvSpPr>
+          <p:cNvPr id="3" name="Inhaltsplatzhalter 2">
+            <a:extLst>
+              <a:ext uri="{FF2B5EF4-FFF2-40B4-BE49-F238E27FC236}">
+                <a16:creationId xmlns:a16="http://schemas.microsoft.com/office/drawing/2014/main" id="{D0172BEE-0B58-4F2D-9324-1B26BFE41ACA}"/>
+              </a:ext>
+            </a:extLst>
+          </p:cNvPr>
+          <p:cNvSpPr>
+            <a:spLocks noGrp="1"/>
+          </p:cNvSpPr>
+          <p:nvPr>
+            <p:ph idx="1"/>
+          </p:nvPr>
+        </p:nvSpPr>
+        <p:spPr/>
+        <p:txBody>
+          <a:bodyPr/>
+          <a:lstStyle/>
+          <a:p>
+            <a:endParaRPr lang="de-DE"/>
+          </a:p>
+        </p:txBody>
+      </p:sp>
+    </p:spTree>
+    <p:extLst>
+      <p:ext uri="{BB962C8B-B14F-4D97-AF65-F5344CB8AC3E}">
+        <p14:creationId xmlns:p14="http://schemas.microsoft.com/office/powerpoint/2010/main" val="3903698768"/>
+      </p:ext>
+    </p:extLst>
+  </p:cSld>
+  <p:clrMapOvr>
+    <a:masterClrMapping/>
+  </p:clrMapOvr>
+</p:sld>
+</file>
+
+<file path=ppt/slides/slide18.xml><?xml version="1.0" encoding="utf-8"?>
+<p:sld xmlns:a="http://schemas.openxmlformats.org/drawingml/2006/main" xmlns:r="http://schemas.openxmlformats.org/officeDocument/2006/relationships" xmlns:p="http://schemas.openxmlformats.org/presentationml/2006/main">
+  <p:cSld>
+    <p:spTree>
+      <p:nvGrpSpPr>
+        <p:cNvPr id="1" name=""/>
+        <p:cNvGrpSpPr/>
+        <p:nvPr/>
+      </p:nvGrpSpPr>
+      <p:grpSpPr>
+        <a:xfrm>
+          <a:off x="0" y="0"/>
+          <a:ext cx="0" cy="0"/>
+          <a:chOff x="0" y="0"/>
+          <a:chExt cx="0" cy="0"/>
+        </a:xfrm>
+      </p:grpSpPr>
+      <p:sp>
+        <p:nvSpPr>
+          <p:cNvPr id="2" name="Titel 1">
+            <a:extLst>
+              <a:ext uri="{FF2B5EF4-FFF2-40B4-BE49-F238E27FC236}">
                 <a16:creationId xmlns:a16="http://schemas.microsoft.com/office/drawing/2014/main" id="{0C46D5FB-D6E8-4188-901C-B6DCA9CE668F}"/>
               </a:ext>
             </a:extLst>
@@ -7309,7 +7489,7 @@
 </p:sld>
 </file>
 
-<file path=ppt/slides/slide18.xml><?xml version="1.0" encoding="utf-8"?>
+<file path=ppt/slides/slide19.xml><?xml version="1.0" encoding="utf-8"?>
 <p:sld xmlns:a="http://schemas.openxmlformats.org/drawingml/2006/main" xmlns:r="http://schemas.openxmlformats.org/officeDocument/2006/relationships" xmlns:p="http://schemas.openxmlformats.org/presentationml/2006/main">
   <p:cSld>
     <p:spTree>
@@ -7647,6 +7827,36 @@
           <a:bodyPr/>
           <a:lstStyle/>
           <a:p>
+            <a:endParaRPr lang="de-DE" dirty="0"/>
+          </a:p>
+          <a:p>
+            <a:r>
+              <a:rPr lang="de-DE" dirty="0"/>
+              <a:t>Systembild</a:t>
+            </a:r>
+          </a:p>
+          <a:p>
+            <a:pPr lvl="1"/>
+            <a:r>
+              <a:rPr lang="de-DE" dirty="0"/>
+              <a:t>Designentscheidungen</a:t>
+            </a:r>
+          </a:p>
+          <a:p>
+            <a:r>
+              <a:rPr lang="de-DE" dirty="0"/>
+              <a:t>Umsetzung</a:t>
+            </a:r>
+          </a:p>
+          <a:p>
+            <a:pPr lvl="1"/>
+            <a:r>
+              <a:rPr lang="de-DE" dirty="0"/>
+              <a:t>Meilensteine / Entwicklungsverlauf</a:t>
+            </a:r>
+          </a:p>
+          <a:p>
+            <a:pPr lvl="1"/>
             <a:endParaRPr lang="de-DE" dirty="0"/>
           </a:p>
         </p:txBody>
@@ -8800,7 +9010,7 @@
           <a:p>
             <a:r>
               <a:rPr lang="de-DE" dirty="0"/>
-              <a:t>Umsetzung – Meilensteine und Wendepunkte / Entwicklungsverlauf</a:t>
+              <a:t>Umsetzung – Meilensteine / Entwicklungsverlauf</a:t>
             </a:r>
           </a:p>
         </p:txBody>

</xml_diff>

<commit_message>
Updated Doku + Praesi
</commit_message>
<xml_diff>
--- a/Praesi.pptx
+++ b/Praesi.pptx
@@ -4,6 +4,9 @@
   <p:sldMasterIdLst>
     <p:sldMasterId id="2147483677" r:id="rId1"/>
   </p:sldMasterIdLst>
+  <p:notesMasterIdLst>
+    <p:notesMasterId r:id="rId21"/>
+  </p:notesMasterIdLst>
   <p:sldIdLst>
     <p:sldId id="256" r:id="rId2"/>
     <p:sldId id="257" r:id="rId3"/>
@@ -128,6 +131,446 @@
     </p:ext>
   </p:extLst>
 </p:presentation>
+</file>
+
+<file path=ppt/notesMasters/notesMaster1.xml><?xml version="1.0" encoding="utf-8"?>
+<p:notesMaster xmlns:a="http://schemas.openxmlformats.org/drawingml/2006/main" xmlns:r="http://schemas.openxmlformats.org/officeDocument/2006/relationships" xmlns:p="http://schemas.openxmlformats.org/presentationml/2006/main">
+  <p:cSld>
+    <p:bg>
+      <p:bgRef idx="1001">
+        <a:schemeClr val="bg1"/>
+      </p:bgRef>
+    </p:bg>
+    <p:spTree>
+      <p:nvGrpSpPr>
+        <p:cNvPr id="1" name=""/>
+        <p:cNvGrpSpPr/>
+        <p:nvPr/>
+      </p:nvGrpSpPr>
+      <p:grpSpPr>
+        <a:xfrm>
+          <a:off x="0" y="0"/>
+          <a:ext cx="0" cy="0"/>
+          <a:chOff x="0" y="0"/>
+          <a:chExt cx="0" cy="0"/>
+        </a:xfrm>
+      </p:grpSpPr>
+      <p:sp>
+        <p:nvSpPr>
+          <p:cNvPr id="2" name="Kopfzeilenplatzhalter 1"/>
+          <p:cNvSpPr>
+            <a:spLocks noGrp="1"/>
+          </p:cNvSpPr>
+          <p:nvPr>
+            <p:ph type="hdr" sz="quarter"/>
+          </p:nvPr>
+        </p:nvSpPr>
+        <p:spPr>
+          <a:xfrm>
+            <a:off x="0" y="0"/>
+            <a:ext cx="2971800" cy="458788"/>
+          </a:xfrm>
+          <a:prstGeom prst="rect">
+            <a:avLst/>
+          </a:prstGeom>
+        </p:spPr>
+        <p:txBody>
+          <a:bodyPr vert="horz" lIns="91440" tIns="45720" rIns="91440" bIns="45720" rtlCol="0"/>
+          <a:lstStyle>
+            <a:lvl1pPr algn="l">
+              <a:defRPr sz="1200"/>
+            </a:lvl1pPr>
+          </a:lstStyle>
+          <a:p>
+            <a:endParaRPr lang="de-DE"/>
+          </a:p>
+        </p:txBody>
+      </p:sp>
+      <p:sp>
+        <p:nvSpPr>
+          <p:cNvPr id="3" name="Datumsplatzhalter 2"/>
+          <p:cNvSpPr>
+            <a:spLocks noGrp="1"/>
+          </p:cNvSpPr>
+          <p:nvPr>
+            <p:ph type="dt" idx="1"/>
+          </p:nvPr>
+        </p:nvSpPr>
+        <p:spPr>
+          <a:xfrm>
+            <a:off x="3884613" y="0"/>
+            <a:ext cx="2971800" cy="458788"/>
+          </a:xfrm>
+          <a:prstGeom prst="rect">
+            <a:avLst/>
+          </a:prstGeom>
+        </p:spPr>
+        <p:txBody>
+          <a:bodyPr vert="horz" lIns="91440" tIns="45720" rIns="91440" bIns="45720" rtlCol="0"/>
+          <a:lstStyle>
+            <a:lvl1pPr algn="r">
+              <a:defRPr sz="1200"/>
+            </a:lvl1pPr>
+          </a:lstStyle>
+          <a:p>
+            <a:fld id="{CECECCF7-24F5-4954-9206-0F27343A7004}" type="datetimeFigureOut">
+              <a:rPr lang="de-DE" smtClean="0"/>
+              <a:t>26.01.2019</a:t>
+            </a:fld>
+            <a:endParaRPr lang="de-DE"/>
+          </a:p>
+        </p:txBody>
+      </p:sp>
+      <p:sp>
+        <p:nvSpPr>
+          <p:cNvPr id="4" name="Folienbildplatzhalter 3"/>
+          <p:cNvSpPr>
+            <a:spLocks noGrp="1" noRot="1" noChangeAspect="1"/>
+          </p:cNvSpPr>
+          <p:nvPr>
+            <p:ph type="sldImg" idx="2"/>
+          </p:nvPr>
+        </p:nvSpPr>
+        <p:spPr>
+          <a:xfrm>
+            <a:off x="685800" y="1143000"/>
+            <a:ext cx="5486400" cy="3086100"/>
+          </a:xfrm>
+          <a:prstGeom prst="rect">
+            <a:avLst/>
+          </a:prstGeom>
+          <a:noFill/>
+          <a:ln w="12700">
+            <a:solidFill>
+              <a:prstClr val="black"/>
+            </a:solidFill>
+          </a:ln>
+        </p:spPr>
+        <p:txBody>
+          <a:bodyPr vert="horz" lIns="91440" tIns="45720" rIns="91440" bIns="45720" rtlCol="0" anchor="ctr"/>
+          <a:lstStyle/>
+          <a:p>
+            <a:endParaRPr lang="de-DE"/>
+          </a:p>
+        </p:txBody>
+      </p:sp>
+      <p:sp>
+        <p:nvSpPr>
+          <p:cNvPr id="5" name="Notizenplatzhalter 4"/>
+          <p:cNvSpPr>
+            <a:spLocks noGrp="1"/>
+          </p:cNvSpPr>
+          <p:nvPr>
+            <p:ph type="body" sz="quarter" idx="3"/>
+          </p:nvPr>
+        </p:nvSpPr>
+        <p:spPr>
+          <a:xfrm>
+            <a:off x="685800" y="4400550"/>
+            <a:ext cx="5486400" cy="3600450"/>
+          </a:xfrm>
+          <a:prstGeom prst="rect">
+            <a:avLst/>
+          </a:prstGeom>
+        </p:spPr>
+        <p:txBody>
+          <a:bodyPr vert="horz" lIns="91440" tIns="45720" rIns="91440" bIns="45720" rtlCol="0"/>
+          <a:lstStyle/>
+          <a:p>
+            <a:pPr lvl="0"/>
+            <a:r>
+              <a:rPr lang="de-DE"/>
+              <a:t>Mastertextformat bearbeiten</a:t>
+            </a:r>
+          </a:p>
+          <a:p>
+            <a:pPr lvl="1"/>
+            <a:r>
+              <a:rPr lang="de-DE"/>
+              <a:t>Zweite Ebene</a:t>
+            </a:r>
+          </a:p>
+          <a:p>
+            <a:pPr lvl="2"/>
+            <a:r>
+              <a:rPr lang="de-DE"/>
+              <a:t>Dritte Ebene</a:t>
+            </a:r>
+          </a:p>
+          <a:p>
+            <a:pPr lvl="3"/>
+            <a:r>
+              <a:rPr lang="de-DE"/>
+              <a:t>Vierte Ebene</a:t>
+            </a:r>
+          </a:p>
+          <a:p>
+            <a:pPr lvl="4"/>
+            <a:r>
+              <a:rPr lang="de-DE"/>
+              <a:t>Fünfte Ebene</a:t>
+            </a:r>
+          </a:p>
+        </p:txBody>
+      </p:sp>
+      <p:sp>
+        <p:nvSpPr>
+          <p:cNvPr id="6" name="Fußzeilenplatzhalter 5"/>
+          <p:cNvSpPr>
+            <a:spLocks noGrp="1"/>
+          </p:cNvSpPr>
+          <p:nvPr>
+            <p:ph type="ftr" sz="quarter" idx="4"/>
+          </p:nvPr>
+        </p:nvSpPr>
+        <p:spPr>
+          <a:xfrm>
+            <a:off x="0" y="8685213"/>
+            <a:ext cx="2971800" cy="458787"/>
+          </a:xfrm>
+          <a:prstGeom prst="rect">
+            <a:avLst/>
+          </a:prstGeom>
+        </p:spPr>
+        <p:txBody>
+          <a:bodyPr vert="horz" lIns="91440" tIns="45720" rIns="91440" bIns="45720" rtlCol="0" anchor="b"/>
+          <a:lstStyle>
+            <a:lvl1pPr algn="l">
+              <a:defRPr sz="1200"/>
+            </a:lvl1pPr>
+          </a:lstStyle>
+          <a:p>
+            <a:endParaRPr lang="de-DE"/>
+          </a:p>
+        </p:txBody>
+      </p:sp>
+      <p:sp>
+        <p:nvSpPr>
+          <p:cNvPr id="7" name="Foliennummernplatzhalter 6"/>
+          <p:cNvSpPr>
+            <a:spLocks noGrp="1"/>
+          </p:cNvSpPr>
+          <p:nvPr>
+            <p:ph type="sldNum" sz="quarter" idx="5"/>
+          </p:nvPr>
+        </p:nvSpPr>
+        <p:spPr>
+          <a:xfrm>
+            <a:off x="3884613" y="8685213"/>
+            <a:ext cx="2971800" cy="458787"/>
+          </a:xfrm>
+          <a:prstGeom prst="rect">
+            <a:avLst/>
+          </a:prstGeom>
+        </p:spPr>
+        <p:txBody>
+          <a:bodyPr vert="horz" lIns="91440" tIns="45720" rIns="91440" bIns="45720" rtlCol="0" anchor="b"/>
+          <a:lstStyle>
+            <a:lvl1pPr algn="r">
+              <a:defRPr sz="1200"/>
+            </a:lvl1pPr>
+          </a:lstStyle>
+          <a:p>
+            <a:fld id="{6ABF0EB9-CC47-4AD6-B26F-35737531DE2F}" type="slidenum">
+              <a:rPr lang="de-DE" smtClean="0"/>
+              <a:t>‹Nr.›</a:t>
+            </a:fld>
+            <a:endParaRPr lang="de-DE"/>
+          </a:p>
+        </p:txBody>
+      </p:sp>
+    </p:spTree>
+    <p:extLst>
+      <p:ext uri="{BB962C8B-B14F-4D97-AF65-F5344CB8AC3E}">
+        <p14:creationId xmlns:p14="http://schemas.microsoft.com/office/powerpoint/2010/main" val="944615165"/>
+      </p:ext>
+    </p:extLst>
+  </p:cSld>
+  <p:clrMap bg1="lt1" tx1="dk1" bg2="lt2" tx2="dk2" accent1="accent1" accent2="accent2" accent3="accent3" accent4="accent4" accent5="accent5" accent6="accent6" hlink="hlink" folHlink="folHlink"/>
+  <p:notesStyle>
+    <a:lvl1pPr marL="0" algn="l" defTabSz="914400" rtl="0" eaLnBrk="1" latinLnBrk="0" hangingPunct="1">
+      <a:defRPr sz="1200" kern="1200">
+        <a:solidFill>
+          <a:schemeClr val="tx1"/>
+        </a:solidFill>
+        <a:latin typeface="+mn-lt"/>
+        <a:ea typeface="+mn-ea"/>
+        <a:cs typeface="+mn-cs"/>
+      </a:defRPr>
+    </a:lvl1pPr>
+    <a:lvl2pPr marL="457200" algn="l" defTabSz="914400" rtl="0" eaLnBrk="1" latinLnBrk="0" hangingPunct="1">
+      <a:defRPr sz="1200" kern="1200">
+        <a:solidFill>
+          <a:schemeClr val="tx1"/>
+        </a:solidFill>
+        <a:latin typeface="+mn-lt"/>
+        <a:ea typeface="+mn-ea"/>
+        <a:cs typeface="+mn-cs"/>
+      </a:defRPr>
+    </a:lvl2pPr>
+    <a:lvl3pPr marL="914400" algn="l" defTabSz="914400" rtl="0" eaLnBrk="1" latinLnBrk="0" hangingPunct="1">
+      <a:defRPr sz="1200" kern="1200">
+        <a:solidFill>
+          <a:schemeClr val="tx1"/>
+        </a:solidFill>
+        <a:latin typeface="+mn-lt"/>
+        <a:ea typeface="+mn-ea"/>
+        <a:cs typeface="+mn-cs"/>
+      </a:defRPr>
+    </a:lvl3pPr>
+    <a:lvl4pPr marL="1371600" algn="l" defTabSz="914400" rtl="0" eaLnBrk="1" latinLnBrk="0" hangingPunct="1">
+      <a:defRPr sz="1200" kern="1200">
+        <a:solidFill>
+          <a:schemeClr val="tx1"/>
+        </a:solidFill>
+        <a:latin typeface="+mn-lt"/>
+        <a:ea typeface="+mn-ea"/>
+        <a:cs typeface="+mn-cs"/>
+      </a:defRPr>
+    </a:lvl4pPr>
+    <a:lvl5pPr marL="1828800" algn="l" defTabSz="914400" rtl="0" eaLnBrk="1" latinLnBrk="0" hangingPunct="1">
+      <a:defRPr sz="1200" kern="1200">
+        <a:solidFill>
+          <a:schemeClr val="tx1"/>
+        </a:solidFill>
+        <a:latin typeface="+mn-lt"/>
+        <a:ea typeface="+mn-ea"/>
+        <a:cs typeface="+mn-cs"/>
+      </a:defRPr>
+    </a:lvl5pPr>
+    <a:lvl6pPr marL="2286000" algn="l" defTabSz="914400" rtl="0" eaLnBrk="1" latinLnBrk="0" hangingPunct="1">
+      <a:defRPr sz="1200" kern="1200">
+        <a:solidFill>
+          <a:schemeClr val="tx1"/>
+        </a:solidFill>
+        <a:latin typeface="+mn-lt"/>
+        <a:ea typeface="+mn-ea"/>
+        <a:cs typeface="+mn-cs"/>
+      </a:defRPr>
+    </a:lvl6pPr>
+    <a:lvl7pPr marL="2743200" algn="l" defTabSz="914400" rtl="0" eaLnBrk="1" latinLnBrk="0" hangingPunct="1">
+      <a:defRPr sz="1200" kern="1200">
+        <a:solidFill>
+          <a:schemeClr val="tx1"/>
+        </a:solidFill>
+        <a:latin typeface="+mn-lt"/>
+        <a:ea typeface="+mn-ea"/>
+        <a:cs typeface="+mn-cs"/>
+      </a:defRPr>
+    </a:lvl7pPr>
+    <a:lvl8pPr marL="3200400" algn="l" defTabSz="914400" rtl="0" eaLnBrk="1" latinLnBrk="0" hangingPunct="1">
+      <a:defRPr sz="1200" kern="1200">
+        <a:solidFill>
+          <a:schemeClr val="tx1"/>
+        </a:solidFill>
+        <a:latin typeface="+mn-lt"/>
+        <a:ea typeface="+mn-ea"/>
+        <a:cs typeface="+mn-cs"/>
+      </a:defRPr>
+    </a:lvl8pPr>
+    <a:lvl9pPr marL="3657600" algn="l" defTabSz="914400" rtl="0" eaLnBrk="1" latinLnBrk="0" hangingPunct="1">
+      <a:defRPr sz="1200" kern="1200">
+        <a:solidFill>
+          <a:schemeClr val="tx1"/>
+        </a:solidFill>
+        <a:latin typeface="+mn-lt"/>
+        <a:ea typeface="+mn-ea"/>
+        <a:cs typeface="+mn-cs"/>
+      </a:defRPr>
+    </a:lvl9pPr>
+  </p:notesStyle>
+</p:notesMaster>
+</file>
+
+<file path=ppt/notesSlides/notesSlide1.xml><?xml version="1.0" encoding="utf-8"?>
+<p:notes xmlns:a="http://schemas.openxmlformats.org/drawingml/2006/main" xmlns:r="http://schemas.openxmlformats.org/officeDocument/2006/relationships" xmlns:p="http://schemas.openxmlformats.org/presentationml/2006/main">
+  <p:cSld>
+    <p:spTree>
+      <p:nvGrpSpPr>
+        <p:cNvPr id="1" name=""/>
+        <p:cNvGrpSpPr/>
+        <p:nvPr/>
+      </p:nvGrpSpPr>
+      <p:grpSpPr>
+        <a:xfrm>
+          <a:off x="0" y="0"/>
+          <a:ext cx="0" cy="0"/>
+          <a:chOff x="0" y="0"/>
+          <a:chExt cx="0" cy="0"/>
+        </a:xfrm>
+      </p:grpSpPr>
+      <p:sp>
+        <p:nvSpPr>
+          <p:cNvPr id="2" name="Folienbildplatzhalter 1"/>
+          <p:cNvSpPr>
+            <a:spLocks noGrp="1" noRot="1" noChangeAspect="1"/>
+          </p:cNvSpPr>
+          <p:nvPr>
+            <p:ph type="sldImg"/>
+          </p:nvPr>
+        </p:nvSpPr>
+        <p:spPr/>
+      </p:sp>
+      <p:sp>
+        <p:nvSpPr>
+          <p:cNvPr id="3" name="Notizenplatzhalter 2"/>
+          <p:cNvSpPr>
+            <a:spLocks noGrp="1"/>
+          </p:cNvSpPr>
+          <p:nvPr>
+            <p:ph type="body" idx="1"/>
+          </p:nvPr>
+        </p:nvSpPr>
+        <p:spPr/>
+        <p:txBody>
+          <a:bodyPr/>
+          <a:lstStyle/>
+          <a:p>
+            <a:r>
+              <a:rPr lang="de-DE" dirty="0"/>
+              <a:t>Wofür ist die Folie? Bzw. was soll </a:t>
+            </a:r>
+            <a:r>
+              <a:rPr lang="de-DE"/>
+              <a:t>sie aussagen?</a:t>
+            </a:r>
+          </a:p>
+        </p:txBody>
+      </p:sp>
+      <p:sp>
+        <p:nvSpPr>
+          <p:cNvPr id="4" name="Foliennummernplatzhalter 3"/>
+          <p:cNvSpPr>
+            <a:spLocks noGrp="1"/>
+          </p:cNvSpPr>
+          <p:nvPr>
+            <p:ph type="sldNum" sz="quarter" idx="5"/>
+          </p:nvPr>
+        </p:nvSpPr>
+        <p:spPr/>
+        <p:txBody>
+          <a:bodyPr/>
+          <a:lstStyle/>
+          <a:p>
+            <a:fld id="{6ABF0EB9-CC47-4AD6-B26F-35737531DE2F}" type="slidenum">
+              <a:rPr lang="de-DE" smtClean="0"/>
+              <a:t>9</a:t>
+            </a:fld>
+            <a:endParaRPr lang="de-DE"/>
+          </a:p>
+        </p:txBody>
+      </p:sp>
+    </p:spTree>
+    <p:extLst>
+      <p:ext uri="{BB962C8B-B14F-4D97-AF65-F5344CB8AC3E}">
+        <p14:creationId xmlns:p14="http://schemas.microsoft.com/office/powerpoint/2010/main" val="1062172145"/>
+      </p:ext>
+    </p:extLst>
+  </p:cSld>
+  <p:clrMapOvr>
+    <a:masterClrMapping/>
+  </p:clrMapOvr>
+</p:notes>
 </file>
 
 <file path=ppt/slideLayouts/slideLayout1.xml><?xml version="1.0" encoding="utf-8"?>
@@ -852,7 +1295,7 @@
           <a:p>
             <a:fld id="{25603A24-7872-46E1-9181-D252AF9AEB68}" type="datetimeFigureOut">
               <a:rPr lang="de-DE" smtClean="0"/>
-              <a:t>25.01.2019</a:t>
+              <a:t>26.01.2019</a:t>
             </a:fld>
             <a:endParaRPr lang="de-DE"/>
           </a:p>
@@ -1103,7 +1546,7 @@
           <a:p>
             <a:fld id="{25603A24-7872-46E1-9181-D252AF9AEB68}" type="datetimeFigureOut">
               <a:rPr lang="de-DE" smtClean="0"/>
-              <a:t>25.01.2019</a:t>
+              <a:t>26.01.2019</a:t>
             </a:fld>
             <a:endParaRPr lang="de-DE"/>
           </a:p>
@@ -1417,7 +1860,7 @@
           <a:p>
             <a:fld id="{25603A24-7872-46E1-9181-D252AF9AEB68}" type="datetimeFigureOut">
               <a:rPr lang="de-DE" smtClean="0"/>
-              <a:t>25.01.2019</a:t>
+              <a:t>26.01.2019</a:t>
             </a:fld>
             <a:endParaRPr lang="de-DE"/>
           </a:p>
@@ -1758,7 +2201,7 @@
           <a:p>
             <a:fld id="{25603A24-7872-46E1-9181-D252AF9AEB68}" type="datetimeFigureOut">
               <a:rPr lang="de-DE" smtClean="0"/>
-              <a:t>25.01.2019</a:t>
+              <a:t>26.01.2019</a:t>
             </a:fld>
             <a:endParaRPr lang="de-DE"/>
           </a:p>
@@ -2072,7 +2515,7 @@
           <a:p>
             <a:fld id="{25603A24-7872-46E1-9181-D252AF9AEB68}" type="datetimeFigureOut">
               <a:rPr lang="de-DE" smtClean="0"/>
-              <a:t>25.01.2019</a:t>
+              <a:t>26.01.2019</a:t>
             </a:fld>
             <a:endParaRPr lang="de-DE"/>
           </a:p>
@@ -2465,7 +2908,7 @@
           <a:p>
             <a:fld id="{25603A24-7872-46E1-9181-D252AF9AEB68}" type="datetimeFigureOut">
               <a:rPr lang="de-DE" smtClean="0"/>
-              <a:t>25.01.2019</a:t>
+              <a:t>26.01.2019</a:t>
             </a:fld>
             <a:endParaRPr lang="de-DE"/>
           </a:p>
@@ -2635,7 +3078,7 @@
           <a:p>
             <a:fld id="{25603A24-7872-46E1-9181-D252AF9AEB68}" type="datetimeFigureOut">
               <a:rPr lang="de-DE" smtClean="0"/>
-              <a:t>25.01.2019</a:t>
+              <a:t>26.01.2019</a:t>
             </a:fld>
             <a:endParaRPr lang="de-DE"/>
           </a:p>
@@ -2815,7 +3258,7 @@
           <a:p>
             <a:fld id="{25603A24-7872-46E1-9181-D252AF9AEB68}" type="datetimeFigureOut">
               <a:rPr lang="de-DE" smtClean="0"/>
-              <a:t>25.01.2019</a:t>
+              <a:t>26.01.2019</a:t>
             </a:fld>
             <a:endParaRPr lang="de-DE"/>
           </a:p>
@@ -2991,7 +3434,7 @@
           <a:p>
             <a:fld id="{25603A24-7872-46E1-9181-D252AF9AEB68}" type="datetimeFigureOut">
               <a:rPr lang="de-DE" smtClean="0"/>
-              <a:t>25.01.2019</a:t>
+              <a:t>26.01.2019</a:t>
             </a:fld>
             <a:endParaRPr lang="de-DE"/>
           </a:p>
@@ -3238,7 +3681,7 @@
           <a:p>
             <a:fld id="{25603A24-7872-46E1-9181-D252AF9AEB68}" type="datetimeFigureOut">
               <a:rPr lang="de-DE" smtClean="0"/>
-              <a:t>25.01.2019</a:t>
+              <a:t>26.01.2019</a:t>
             </a:fld>
             <a:endParaRPr lang="de-DE"/>
           </a:p>
@@ -3470,7 +3913,7 @@
           <a:p>
             <a:fld id="{25603A24-7872-46E1-9181-D252AF9AEB68}" type="datetimeFigureOut">
               <a:rPr lang="de-DE" smtClean="0"/>
-              <a:t>25.01.2019</a:t>
+              <a:t>26.01.2019</a:t>
             </a:fld>
             <a:endParaRPr lang="de-DE"/>
           </a:p>
@@ -3844,7 +4287,7 @@
           <a:p>
             <a:fld id="{25603A24-7872-46E1-9181-D252AF9AEB68}" type="datetimeFigureOut">
               <a:rPr lang="de-DE" smtClean="0"/>
-              <a:t>25.01.2019</a:t>
+              <a:t>26.01.2019</a:t>
             </a:fld>
             <a:endParaRPr lang="de-DE"/>
           </a:p>
@@ -3967,7 +4410,7 @@
           <a:p>
             <a:fld id="{25603A24-7872-46E1-9181-D252AF9AEB68}" type="datetimeFigureOut">
               <a:rPr lang="de-DE" smtClean="0"/>
-              <a:t>25.01.2019</a:t>
+              <a:t>26.01.2019</a:t>
             </a:fld>
             <a:endParaRPr lang="de-DE"/>
           </a:p>
@@ -4062,7 +4505,7 @@
           <a:p>
             <a:fld id="{25603A24-7872-46E1-9181-D252AF9AEB68}" type="datetimeFigureOut">
               <a:rPr lang="de-DE" smtClean="0"/>
-              <a:t>25.01.2019</a:t>
+              <a:t>26.01.2019</a:t>
             </a:fld>
             <a:endParaRPr lang="de-DE"/>
           </a:p>
@@ -4317,7 +4760,7 @@
           <a:p>
             <a:fld id="{25603A24-7872-46E1-9181-D252AF9AEB68}" type="datetimeFigureOut">
               <a:rPr lang="de-DE" smtClean="0"/>
-              <a:t>25.01.2019</a:t>
+              <a:t>26.01.2019</a:t>
             </a:fld>
             <a:endParaRPr lang="de-DE"/>
           </a:p>
@@ -4580,7 +5023,7 @@
           <a:p>
             <a:fld id="{25603A24-7872-46E1-9181-D252AF9AEB68}" type="datetimeFigureOut">
               <a:rPr lang="de-DE" smtClean="0"/>
-              <a:t>25.01.2019</a:t>
+              <a:t>26.01.2019</a:t>
             </a:fld>
             <a:endParaRPr lang="de-DE"/>
           </a:p>
@@ -5323,7 +5766,7 @@
           <a:p>
             <a:fld id="{25603A24-7872-46E1-9181-D252AF9AEB68}" type="datetimeFigureOut">
               <a:rPr lang="de-DE" smtClean="0"/>
-              <a:t>25.01.2019</a:t>
+              <a:t>26.01.2019</a:t>
             </a:fld>
             <a:endParaRPr lang="de-DE"/>
           </a:p>
@@ -6669,7 +7112,15 @@
           <a:p>
             <a:r>
               <a:rPr lang="de-DE" dirty="0"/>
-              <a:t>Systembild – Designentscheidung: Was es tut.</a:t>
+              <a:t>Anforderungen – </a:t>
+            </a:r>
+            <a:r>
+              <a:rPr lang="de-DE" dirty="0" err="1"/>
+              <a:t>Leap</a:t>
+            </a:r>
+            <a:r>
+              <a:rPr lang="de-DE" dirty="0"/>
+              <a:t> Motion: Was es tun soll.</a:t>
             </a:r>
           </a:p>
           <a:p>
@@ -6862,7 +7313,7 @@
           <a:p>
             <a:r>
               <a:rPr lang="de-DE" dirty="0"/>
-              <a:t>texturieren</a:t>
+              <a:t>Texturieren</a:t>
             </a:r>
           </a:p>
         </p:txBody>
@@ -7916,31 +8367,6 @@
               <a:rPr lang="de-DE" dirty="0"/>
               <a:t>Systembild</a:t>
             </a:r>
-          </a:p>
-        </p:txBody>
-      </p:sp>
-      <p:sp>
-        <p:nvSpPr>
-          <p:cNvPr id="3" name="Inhaltsplatzhalter 2">
-            <a:extLst>
-              <a:ext uri="{FF2B5EF4-FFF2-40B4-BE49-F238E27FC236}">
-                <a16:creationId xmlns:a16="http://schemas.microsoft.com/office/drawing/2014/main" id="{23E308A7-68EF-49A5-8049-6734091F4301}"/>
-              </a:ext>
-            </a:extLst>
-          </p:cNvPr>
-          <p:cNvSpPr>
-            <a:spLocks noGrp="1"/>
-          </p:cNvSpPr>
-          <p:nvPr>
-            <p:ph idx="1"/>
-          </p:nvPr>
-        </p:nvSpPr>
-        <p:spPr/>
-        <p:txBody>
-          <a:bodyPr/>
-          <a:lstStyle/>
-          <a:p>
-            <a:endParaRPr lang="de-DE"/>
           </a:p>
         </p:txBody>
       </p:sp>
@@ -8574,14 +9000,7 @@
           <a:p>
             <a:r>
               <a:rPr lang="de-DE" dirty="0"/>
-              <a:t>Systembild – Designentscheidung</a:t>
-            </a:r>
-            <a:br>
-              <a:rPr lang="de-DE" dirty="0"/>
-            </a:br>
-            <a:r>
-              <a:rPr lang="de-DE" dirty="0"/>
-              <a:t>- Arduino</a:t>
+              <a:t>Anforderungen - Arduino</a:t>
             </a:r>
           </a:p>
         </p:txBody>
@@ -8784,14 +9203,7 @@
           <a:p>
             <a:r>
               <a:rPr lang="de-DE" dirty="0"/>
-              <a:t>Systembild – Designentscheidung</a:t>
-            </a:r>
-            <a:br>
-              <a:rPr lang="de-DE" dirty="0"/>
-            </a:br>
-            <a:r>
-              <a:rPr lang="de-DE" dirty="0"/>
-              <a:t>- </a:t>
+              <a:t>Anforderungen- </a:t>
             </a:r>
             <a:r>
               <a:rPr lang="de-DE" dirty="0" err="1"/>
@@ -9537,4 +9949,299 @@
     </a:ext>
   </a:extLst>
 </a:theme>
+</file>
+
+<file path=ppt/theme/theme2.xml><?xml version="1.0" encoding="utf-8"?>
+<a:theme xmlns:a="http://schemas.openxmlformats.org/drawingml/2006/main" name="Office">
+  <a:themeElements>
+    <a:clrScheme name="Office">
+      <a:dk1>
+        <a:sysClr val="windowText" lastClr="000000"/>
+      </a:dk1>
+      <a:lt1>
+        <a:sysClr val="window" lastClr="FFFFFF"/>
+      </a:lt1>
+      <a:dk2>
+        <a:srgbClr val="44546A"/>
+      </a:dk2>
+      <a:lt2>
+        <a:srgbClr val="E7E6E6"/>
+      </a:lt2>
+      <a:accent1>
+        <a:srgbClr val="4472C4"/>
+      </a:accent1>
+      <a:accent2>
+        <a:srgbClr val="ED7D31"/>
+      </a:accent2>
+      <a:accent3>
+        <a:srgbClr val="A5A5A5"/>
+      </a:accent3>
+      <a:accent4>
+        <a:srgbClr val="FFC000"/>
+      </a:accent4>
+      <a:accent5>
+        <a:srgbClr val="5B9BD5"/>
+      </a:accent5>
+      <a:accent6>
+        <a:srgbClr val="70AD47"/>
+      </a:accent6>
+      <a:hlink>
+        <a:srgbClr val="0563C1"/>
+      </a:hlink>
+      <a:folHlink>
+        <a:srgbClr val="954F72"/>
+      </a:folHlink>
+    </a:clrScheme>
+    <a:fontScheme name="Office">
+      <a:majorFont>
+        <a:latin typeface="Calibri Light" panose="020F0302020204030204"/>
+        <a:ea typeface=""/>
+        <a:cs typeface=""/>
+        <a:font script="Jpan" typeface="游ゴシック Light"/>
+        <a:font script="Hang" typeface="맑은 고딕"/>
+        <a:font script="Hans" typeface="等线 Light"/>
+        <a:font script="Hant" typeface="新細明體"/>
+        <a:font script="Arab" typeface="Times New Roman"/>
+        <a:font script="Hebr" typeface="Times New Roman"/>
+        <a:font script="Thai" typeface="Angsana New"/>
+        <a:font script="Ethi" typeface="Nyala"/>
+        <a:font script="Beng" typeface="Vrinda"/>
+        <a:font script="Gujr" typeface="Shruti"/>
+        <a:font script="Khmr" typeface="MoolBoran"/>
+        <a:font script="Knda" typeface="Tunga"/>
+        <a:font script="Guru" typeface="Raavi"/>
+        <a:font script="Cans" typeface="Euphemia"/>
+        <a:font script="Cher" typeface="Plantagenet Cherokee"/>
+        <a:font script="Yiii" typeface="Microsoft Yi Baiti"/>
+        <a:font script="Tibt" typeface="Microsoft Himalaya"/>
+        <a:font script="Thaa" typeface="MV Boli"/>
+        <a:font script="Deva" typeface="Mangal"/>
+        <a:font script="Telu" typeface="Gautami"/>
+        <a:font script="Taml" typeface="Latha"/>
+        <a:font script="Syrc" typeface="Estrangelo Edessa"/>
+        <a:font script="Orya" typeface="Kalinga"/>
+        <a:font script="Mlym" typeface="Kartika"/>
+        <a:font script="Laoo" typeface="DokChampa"/>
+        <a:font script="Sinh" typeface="Iskoola Pota"/>
+        <a:font script="Mong" typeface="Mongolian Baiti"/>
+        <a:font script="Viet" typeface="Times New Roman"/>
+        <a:font script="Uigh" typeface="Microsoft Uighur"/>
+        <a:font script="Geor" typeface="Sylfaen"/>
+        <a:font script="Armn" typeface="Arial"/>
+        <a:font script="Bugi" typeface="Leelawadee UI"/>
+        <a:font script="Bopo" typeface="Microsoft JhengHei"/>
+        <a:font script="Java" typeface="Javanese Text"/>
+        <a:font script="Lisu" typeface="Segoe UI"/>
+        <a:font script="Mymr" typeface="Myanmar Text"/>
+        <a:font script="Nkoo" typeface="Ebrima"/>
+        <a:font script="Olck" typeface="Nirmala UI"/>
+        <a:font script="Osma" typeface="Ebrima"/>
+        <a:font script="Phag" typeface="Phagspa"/>
+        <a:font script="Syrn" typeface="Estrangelo Edessa"/>
+        <a:font script="Syrj" typeface="Estrangelo Edessa"/>
+        <a:font script="Syre" typeface="Estrangelo Edessa"/>
+        <a:font script="Sora" typeface="Nirmala UI"/>
+        <a:font script="Tale" typeface="Microsoft Tai Le"/>
+        <a:font script="Talu" typeface="Microsoft New Tai Lue"/>
+        <a:font script="Tfng" typeface="Ebrima"/>
+      </a:majorFont>
+      <a:minorFont>
+        <a:latin typeface="Calibri" panose="020F0502020204030204"/>
+        <a:ea typeface=""/>
+        <a:cs typeface=""/>
+        <a:font script="Jpan" typeface="游ゴシック"/>
+        <a:font script="Hang" typeface="맑은 고딕"/>
+        <a:font script="Hans" typeface="等线"/>
+        <a:font script="Hant" typeface="新細明體"/>
+        <a:font script="Arab" typeface="Arial"/>
+        <a:font script="Hebr" typeface="Arial"/>
+        <a:font script="Thai" typeface="Cordia New"/>
+        <a:font script="Ethi" typeface="Nyala"/>
+        <a:font script="Beng" typeface="Vrinda"/>
+        <a:font script="Gujr" typeface="Shruti"/>
+        <a:font script="Khmr" typeface="DaunPenh"/>
+        <a:font script="Knda" typeface="Tunga"/>
+        <a:font script="Guru" typeface="Raavi"/>
+        <a:font script="Cans" typeface="Euphemia"/>
+        <a:font script="Cher" typeface="Plantagenet Cherokee"/>
+        <a:font script="Yiii" typeface="Microsoft Yi Baiti"/>
+        <a:font script="Tibt" typeface="Microsoft Himalaya"/>
+        <a:font script="Thaa" typeface="MV Boli"/>
+        <a:font script="Deva" typeface="Mangal"/>
+        <a:font script="Telu" typeface="Gautami"/>
+        <a:font script="Taml" typeface="Latha"/>
+        <a:font script="Syrc" typeface="Estrangelo Edessa"/>
+        <a:font script="Orya" typeface="Kalinga"/>
+        <a:font script="Mlym" typeface="Kartika"/>
+        <a:font script="Laoo" typeface="DokChampa"/>
+        <a:font script="Sinh" typeface="Iskoola Pota"/>
+        <a:font script="Mong" typeface="Mongolian Baiti"/>
+        <a:font script="Viet" typeface="Arial"/>
+        <a:font script="Uigh" typeface="Microsoft Uighur"/>
+        <a:font script="Geor" typeface="Sylfaen"/>
+        <a:font script="Armn" typeface="Arial"/>
+        <a:font script="Bugi" typeface="Leelawadee UI"/>
+        <a:font script="Bopo" typeface="Microsoft JhengHei"/>
+        <a:font script="Java" typeface="Javanese Text"/>
+        <a:font script="Lisu" typeface="Segoe UI"/>
+        <a:font script="Mymr" typeface="Myanmar Text"/>
+        <a:font script="Nkoo" typeface="Ebrima"/>
+        <a:font script="Olck" typeface="Nirmala UI"/>
+        <a:font script="Osma" typeface="Ebrima"/>
+        <a:font script="Phag" typeface="Phagspa"/>
+        <a:font script="Syrn" typeface="Estrangelo Edessa"/>
+        <a:font script="Syrj" typeface="Estrangelo Edessa"/>
+        <a:font script="Syre" typeface="Estrangelo Edessa"/>
+        <a:font script="Sora" typeface="Nirmala UI"/>
+        <a:font script="Tale" typeface="Microsoft Tai Le"/>
+        <a:font script="Talu" typeface="Microsoft New Tai Lue"/>
+        <a:font script="Tfng" typeface="Ebrima"/>
+      </a:minorFont>
+    </a:fontScheme>
+    <a:fmtScheme name="Office">
+      <a:fillStyleLst>
+        <a:solidFill>
+          <a:schemeClr val="phClr"/>
+        </a:solidFill>
+        <a:gradFill rotWithShape="1">
+          <a:gsLst>
+            <a:gs pos="0">
+              <a:schemeClr val="phClr">
+                <a:lumMod val="110000"/>
+                <a:satMod val="105000"/>
+                <a:tint val="67000"/>
+              </a:schemeClr>
+            </a:gs>
+            <a:gs pos="50000">
+              <a:schemeClr val="phClr">
+                <a:lumMod val="105000"/>
+                <a:satMod val="103000"/>
+                <a:tint val="73000"/>
+              </a:schemeClr>
+            </a:gs>
+            <a:gs pos="100000">
+              <a:schemeClr val="phClr">
+                <a:lumMod val="105000"/>
+                <a:satMod val="109000"/>
+                <a:tint val="81000"/>
+              </a:schemeClr>
+            </a:gs>
+          </a:gsLst>
+          <a:lin ang="5400000" scaled="0"/>
+        </a:gradFill>
+        <a:gradFill rotWithShape="1">
+          <a:gsLst>
+            <a:gs pos="0">
+              <a:schemeClr val="phClr">
+                <a:satMod val="103000"/>
+                <a:lumMod val="102000"/>
+                <a:tint val="94000"/>
+              </a:schemeClr>
+            </a:gs>
+            <a:gs pos="50000">
+              <a:schemeClr val="phClr">
+                <a:satMod val="110000"/>
+                <a:lumMod val="100000"/>
+                <a:shade val="100000"/>
+              </a:schemeClr>
+            </a:gs>
+            <a:gs pos="100000">
+              <a:schemeClr val="phClr">
+                <a:lumMod val="99000"/>
+                <a:satMod val="120000"/>
+                <a:shade val="78000"/>
+              </a:schemeClr>
+            </a:gs>
+          </a:gsLst>
+          <a:lin ang="5400000" scaled="0"/>
+        </a:gradFill>
+      </a:fillStyleLst>
+      <a:lnStyleLst>
+        <a:ln w="6350" cap="flat" cmpd="sng" algn="ctr">
+          <a:solidFill>
+            <a:schemeClr val="phClr"/>
+          </a:solidFill>
+          <a:prstDash val="solid"/>
+          <a:miter lim="800000"/>
+        </a:ln>
+        <a:ln w="12700" cap="flat" cmpd="sng" algn="ctr">
+          <a:solidFill>
+            <a:schemeClr val="phClr"/>
+          </a:solidFill>
+          <a:prstDash val="solid"/>
+          <a:miter lim="800000"/>
+        </a:ln>
+        <a:ln w="19050" cap="flat" cmpd="sng" algn="ctr">
+          <a:solidFill>
+            <a:schemeClr val="phClr"/>
+          </a:solidFill>
+          <a:prstDash val="solid"/>
+          <a:miter lim="800000"/>
+        </a:ln>
+      </a:lnStyleLst>
+      <a:effectStyleLst>
+        <a:effectStyle>
+          <a:effectLst/>
+        </a:effectStyle>
+        <a:effectStyle>
+          <a:effectLst/>
+        </a:effectStyle>
+        <a:effectStyle>
+          <a:effectLst>
+            <a:outerShdw blurRad="57150" dist="19050" dir="5400000" algn="ctr" rotWithShape="0">
+              <a:srgbClr val="000000">
+                <a:alpha val="63000"/>
+              </a:srgbClr>
+            </a:outerShdw>
+          </a:effectLst>
+        </a:effectStyle>
+      </a:effectStyleLst>
+      <a:bgFillStyleLst>
+        <a:solidFill>
+          <a:schemeClr val="phClr"/>
+        </a:solidFill>
+        <a:solidFill>
+          <a:schemeClr val="phClr">
+            <a:tint val="95000"/>
+            <a:satMod val="170000"/>
+          </a:schemeClr>
+        </a:solidFill>
+        <a:gradFill rotWithShape="1">
+          <a:gsLst>
+            <a:gs pos="0">
+              <a:schemeClr val="phClr">
+                <a:tint val="93000"/>
+                <a:satMod val="150000"/>
+                <a:shade val="98000"/>
+                <a:lumMod val="102000"/>
+              </a:schemeClr>
+            </a:gs>
+            <a:gs pos="50000">
+              <a:schemeClr val="phClr">
+                <a:tint val="98000"/>
+                <a:satMod val="130000"/>
+                <a:shade val="90000"/>
+                <a:lumMod val="103000"/>
+              </a:schemeClr>
+            </a:gs>
+            <a:gs pos="100000">
+              <a:schemeClr val="phClr">
+                <a:shade val="63000"/>
+                <a:satMod val="120000"/>
+              </a:schemeClr>
+            </a:gs>
+          </a:gsLst>
+          <a:lin ang="5400000" scaled="0"/>
+        </a:gradFill>
+      </a:bgFillStyleLst>
+    </a:fmtScheme>
+  </a:themeElements>
+  <a:objectDefaults/>
+  <a:extraClrSchemeLst/>
+  <a:extLst>
+    <a:ext uri="{05A4C25C-085E-4340-85A3-A5531E510DB2}">
+      <thm15:themeFamily xmlns:thm15="http://schemas.microsoft.com/office/thememl/2012/main" name="Office Theme" id="{62F939B6-93AF-4DB8-9C6B-D6C7DFDC589F}" vid="{4A3C46E8-61CC-4603-A589-7422A47A8E4A}"/>
+    </a:ext>
+  </a:extLst>
+</a:theme>
 </file>
</xml_diff>

<commit_message>
documented LeapController, Update to .doc & .ppx
</commit_message>
<xml_diff>
--- a/Praesi.pptx
+++ b/Praesi.pptx
@@ -853,7 +853,7 @@
           <a:p>
             <a:fld id="{25603A24-7872-46E1-9181-D252AF9AEB68}" type="datetimeFigureOut">
               <a:rPr lang="de-DE" smtClean="0"/>
-              <a:t>26.01.2019</a:t>
+              <a:t>27.01.2019</a:t>
             </a:fld>
             <a:endParaRPr lang="de-DE"/>
           </a:p>
@@ -1104,7 +1104,7 @@
           <a:p>
             <a:fld id="{25603A24-7872-46E1-9181-D252AF9AEB68}" type="datetimeFigureOut">
               <a:rPr lang="de-DE" smtClean="0"/>
-              <a:t>26.01.2019</a:t>
+              <a:t>27.01.2019</a:t>
             </a:fld>
             <a:endParaRPr lang="de-DE"/>
           </a:p>
@@ -1418,7 +1418,7 @@
           <a:p>
             <a:fld id="{25603A24-7872-46E1-9181-D252AF9AEB68}" type="datetimeFigureOut">
               <a:rPr lang="de-DE" smtClean="0"/>
-              <a:t>26.01.2019</a:t>
+              <a:t>27.01.2019</a:t>
             </a:fld>
             <a:endParaRPr lang="de-DE"/>
           </a:p>
@@ -1759,7 +1759,7 @@
           <a:p>
             <a:fld id="{25603A24-7872-46E1-9181-D252AF9AEB68}" type="datetimeFigureOut">
               <a:rPr lang="de-DE" smtClean="0"/>
-              <a:t>26.01.2019</a:t>
+              <a:t>27.01.2019</a:t>
             </a:fld>
             <a:endParaRPr lang="de-DE"/>
           </a:p>
@@ -2073,7 +2073,7 @@
           <a:p>
             <a:fld id="{25603A24-7872-46E1-9181-D252AF9AEB68}" type="datetimeFigureOut">
               <a:rPr lang="de-DE" smtClean="0"/>
-              <a:t>26.01.2019</a:t>
+              <a:t>27.01.2019</a:t>
             </a:fld>
             <a:endParaRPr lang="de-DE"/>
           </a:p>
@@ -2466,7 +2466,7 @@
           <a:p>
             <a:fld id="{25603A24-7872-46E1-9181-D252AF9AEB68}" type="datetimeFigureOut">
               <a:rPr lang="de-DE" smtClean="0"/>
-              <a:t>26.01.2019</a:t>
+              <a:t>27.01.2019</a:t>
             </a:fld>
             <a:endParaRPr lang="de-DE"/>
           </a:p>
@@ -2636,7 +2636,7 @@
           <a:p>
             <a:fld id="{25603A24-7872-46E1-9181-D252AF9AEB68}" type="datetimeFigureOut">
               <a:rPr lang="de-DE" smtClean="0"/>
-              <a:t>26.01.2019</a:t>
+              <a:t>27.01.2019</a:t>
             </a:fld>
             <a:endParaRPr lang="de-DE"/>
           </a:p>
@@ -2816,7 +2816,7 @@
           <a:p>
             <a:fld id="{25603A24-7872-46E1-9181-D252AF9AEB68}" type="datetimeFigureOut">
               <a:rPr lang="de-DE" smtClean="0"/>
-              <a:t>26.01.2019</a:t>
+              <a:t>27.01.2019</a:t>
             </a:fld>
             <a:endParaRPr lang="de-DE"/>
           </a:p>
@@ -2992,7 +2992,7 @@
           <a:p>
             <a:fld id="{25603A24-7872-46E1-9181-D252AF9AEB68}" type="datetimeFigureOut">
               <a:rPr lang="de-DE" smtClean="0"/>
-              <a:t>26.01.2019</a:t>
+              <a:t>27.01.2019</a:t>
             </a:fld>
             <a:endParaRPr lang="de-DE"/>
           </a:p>
@@ -3239,7 +3239,7 @@
           <a:p>
             <a:fld id="{25603A24-7872-46E1-9181-D252AF9AEB68}" type="datetimeFigureOut">
               <a:rPr lang="de-DE" smtClean="0"/>
-              <a:t>26.01.2019</a:t>
+              <a:t>27.01.2019</a:t>
             </a:fld>
             <a:endParaRPr lang="de-DE"/>
           </a:p>
@@ -3471,7 +3471,7 @@
           <a:p>
             <a:fld id="{25603A24-7872-46E1-9181-D252AF9AEB68}" type="datetimeFigureOut">
               <a:rPr lang="de-DE" smtClean="0"/>
-              <a:t>26.01.2019</a:t>
+              <a:t>27.01.2019</a:t>
             </a:fld>
             <a:endParaRPr lang="de-DE"/>
           </a:p>
@@ -3845,7 +3845,7 @@
           <a:p>
             <a:fld id="{25603A24-7872-46E1-9181-D252AF9AEB68}" type="datetimeFigureOut">
               <a:rPr lang="de-DE" smtClean="0"/>
-              <a:t>26.01.2019</a:t>
+              <a:t>27.01.2019</a:t>
             </a:fld>
             <a:endParaRPr lang="de-DE"/>
           </a:p>
@@ -3968,7 +3968,7 @@
           <a:p>
             <a:fld id="{25603A24-7872-46E1-9181-D252AF9AEB68}" type="datetimeFigureOut">
               <a:rPr lang="de-DE" smtClean="0"/>
-              <a:t>26.01.2019</a:t>
+              <a:t>27.01.2019</a:t>
             </a:fld>
             <a:endParaRPr lang="de-DE"/>
           </a:p>
@@ -4063,7 +4063,7 @@
           <a:p>
             <a:fld id="{25603A24-7872-46E1-9181-D252AF9AEB68}" type="datetimeFigureOut">
               <a:rPr lang="de-DE" smtClean="0"/>
-              <a:t>26.01.2019</a:t>
+              <a:t>27.01.2019</a:t>
             </a:fld>
             <a:endParaRPr lang="de-DE"/>
           </a:p>
@@ -4318,7 +4318,7 @@
           <a:p>
             <a:fld id="{25603A24-7872-46E1-9181-D252AF9AEB68}" type="datetimeFigureOut">
               <a:rPr lang="de-DE" smtClean="0"/>
-              <a:t>26.01.2019</a:t>
+              <a:t>27.01.2019</a:t>
             </a:fld>
             <a:endParaRPr lang="de-DE"/>
           </a:p>
@@ -4581,7 +4581,7 @@
           <a:p>
             <a:fld id="{25603A24-7872-46E1-9181-D252AF9AEB68}" type="datetimeFigureOut">
               <a:rPr lang="de-DE" smtClean="0"/>
-              <a:t>26.01.2019</a:t>
+              <a:t>27.01.2019</a:t>
             </a:fld>
             <a:endParaRPr lang="de-DE"/>
           </a:p>
@@ -5324,7 +5324,7 @@
           <a:p>
             <a:fld id="{25603A24-7872-46E1-9181-D252AF9AEB68}" type="datetimeFigureOut">
               <a:rPr lang="de-DE" smtClean="0"/>
-              <a:t>26.01.2019</a:t>
+              <a:t>27.01.2019</a:t>
             </a:fld>
             <a:endParaRPr lang="de-DE"/>
           </a:p>
@@ -6497,13 +6497,8 @@
             <a:pPr lvl="1"/>
             <a:r>
               <a:rPr lang="de-DE" dirty="0"/>
-              <a:t>Flachdach aus normalen </a:t>
-            </a:r>
-            <a:r>
-              <a:rPr lang="de-DE" dirty="0" err="1"/>
-              <a:t>Steien</a:t>
-            </a:r>
-            <a:endParaRPr lang="de-DE" dirty="0"/>
+              <a:t>Flachdach aus normalen Steinen</a:t>
+            </a:r>
           </a:p>
           <a:p>
             <a:pPr lvl="2"/>
@@ -6526,7 +6521,7 @@
             <a:pPr lvl="1"/>
             <a:r>
               <a:rPr lang="de-DE" dirty="0"/>
-              <a:t>Schwierigkeiten Lego mit Sensoren zu verbinden, dass es stabil bleibt</a:t>
+              <a:t>Schwierigkeiten Lego mit Sensoren zu verbinden, sodass es stabil bleibt</a:t>
             </a:r>
           </a:p>
           <a:p>
@@ -6689,7 +6684,7 @@
             </a:pPr>
             <a:r>
               <a:rPr lang="de-DE" dirty="0"/>
-              <a:t>Seriell werte einlesen und </a:t>
+              <a:t>Seriell Werte einlesen und </a:t>
             </a:r>
             <a:r>
               <a:rPr lang="de-DE" dirty="0" err="1"/>
@@ -6838,7 +6833,7 @@
           <a:p>
             <a:r>
               <a:rPr lang="de-DE" dirty="0"/>
-              <a:t>Funktion um ausgestreckte Finger zu erkenn</a:t>
+              <a:t>Funktion um ausgestreckte Finger zu erkennen</a:t>
             </a:r>
           </a:p>
           <a:p>
@@ -6856,7 +6851,7 @@
               <a:rPr lang="de-DE" dirty="0">
                 <a:sym typeface="Wingdings" panose="05000000000000000000" pitchFamily="2" charset="2"/>
               </a:rPr>
-              <a:t>API</a:t>
+              <a:t> Umsetzung: API</a:t>
             </a:r>
           </a:p>
           <a:p>
@@ -6875,14 +6870,23 @@
               <a:rPr lang="de-DE" dirty="0">
                 <a:sym typeface="Wingdings" panose="05000000000000000000" pitchFamily="2" charset="2"/>
               </a:rPr>
-              <a:t> De-/Aktivieren von Wetter und öffnen/schließen Dachfenster</a:t>
+              <a:t> De-/Aktivieren von Wetter </a:t>
+            </a:r>
+          </a:p>
+          <a:p>
+            <a:pPr lvl="2"/>
+            <a:r>
+              <a:rPr lang="de-DE" dirty="0">
+                <a:sym typeface="Wingdings" panose="05000000000000000000" pitchFamily="2" charset="2"/>
+              </a:rPr>
+              <a:t>Entsprechendes öffnen/schließen des Dachfenster</a:t>
             </a:r>
           </a:p>
           <a:p>
             <a:pPr lvl="1"/>
             <a:r>
               <a:rPr lang="de-DE" dirty="0"/>
-              <a:t>Frameweises Abspeichern und vergleichen der Fingerpositionen</a:t>
+              <a:t>Umsetzung: Frameweises Abspeichern und vergleichen der Fingerpositionen</a:t>
             </a:r>
           </a:p>
         </p:txBody>
@@ -7769,9 +7773,6 @@
           <a:bodyPr/>
           <a:lstStyle/>
           <a:p>
-            <a:endParaRPr lang="de-DE" dirty="0"/>
-          </a:p>
-          <a:p>
             <a:r>
               <a:rPr lang="de-DE" dirty="0"/>
               <a:t>Systembild</a:t>
@@ -8127,10 +8128,9 @@
           <a:lstStyle/>
           <a:p>
             <a:r>
-              <a:rPr lang="de-DE" dirty="0" err="1"/>
-              <a:t>Sytsembild</a:t>
-            </a:r>
-            <a:endParaRPr lang="de-DE" dirty="0"/>
+              <a:rPr lang="de-DE" dirty="0"/>
+              <a:t>Systembild</a:t>
+            </a:r>
           </a:p>
         </p:txBody>
       </p:sp>
@@ -8156,10 +8156,9 @@
           <a:lstStyle/>
           <a:p>
             <a:r>
-              <a:rPr lang="de-DE" dirty="0" err="1"/>
-              <a:t>Systembidl</a:t>
-            </a:r>
-            <a:endParaRPr lang="de-DE" dirty="0"/>
+              <a:rPr lang="de-DE" dirty="0"/>
+              <a:t>Systembild</a:t>
+            </a:r>
           </a:p>
           <a:p>
             <a:pPr lvl="1"/>
@@ -8749,15 +8748,7 @@
             <a:pPr lvl="1"/>
             <a:r>
               <a:rPr lang="de-DE" dirty="0"/>
-              <a:t>Leicht </a:t>
-            </a:r>
-            <a:r>
-              <a:rPr lang="de-DE" dirty="0" err="1"/>
-              <a:t>verbaubar</a:t>
-            </a:r>
-            <a:r>
-              <a:rPr lang="de-DE" dirty="0"/>
-              <a:t> und Änderungen leicht umsetzbar</a:t>
+              <a:t>Leicht zu verbauen und Änderungen leicht umzusetzen</a:t>
             </a:r>
           </a:p>
           <a:p>

</xml_diff>